<commit_message>
Added Lab 1 Materials
</commit_message>
<xml_diff>
--- a/Lab_01/Lab1-Max.pptx
+++ b/Lab_01/Lab1-Max.pptx
@@ -15,12 +15,11 @@
     <p:sldId id="261" r:id="rId9"/>
     <p:sldId id="262" r:id="rId10"/>
     <p:sldId id="263" r:id="rId11"/>
-    <p:sldId id="273" r:id="rId12"/>
-    <p:sldId id="264" r:id="rId13"/>
-    <p:sldId id="265" r:id="rId14"/>
-    <p:sldId id="266" r:id="rId15"/>
-    <p:sldId id="270" r:id="rId16"/>
-    <p:sldId id="267" r:id="rId17"/>
+    <p:sldId id="264" r:id="rId12"/>
+    <p:sldId id="265" r:id="rId13"/>
+    <p:sldId id="266" r:id="rId14"/>
+    <p:sldId id="270" r:id="rId15"/>
+    <p:sldId id="267" r:id="rId16"/>
   </p:sldIdLst>
   <p:sldSz cx="9144000" cy="6858000" type="screen4x3"/>
   <p:notesSz cx="6858000" cy="9144000"/>
@@ -391,7 +390,7 @@
           <a:p>
             <a:fld id="{26516713-2BCE-6145-9123-DB8F3BB907A5}" type="datetimeFigureOut">
               <a:rPr lang="en-US" smtClean="0"/>
-              <a:t>9/7/16</a:t>
+              <a:t>9/15/16</a:t>
             </a:fld>
             <a:endParaRPr lang="en-US"/>
           </a:p>
@@ -605,7 +604,7 @@
           <a:p>
             <a:fld id="{26516713-2BCE-6145-9123-DB8F3BB907A5}" type="datetimeFigureOut">
               <a:rPr lang="en-US" smtClean="0"/>
-              <a:t>9/7/16</a:t>
+              <a:t>9/15/16</a:t>
             </a:fld>
             <a:endParaRPr lang="en-US"/>
           </a:p>
@@ -872,7 +871,7 @@
           <a:p>
             <a:fld id="{26516713-2BCE-6145-9123-DB8F3BB907A5}" type="datetimeFigureOut">
               <a:rPr lang="en-US" smtClean="0"/>
-              <a:t>9/7/16</a:t>
+              <a:t>9/15/16</a:t>
             </a:fld>
             <a:endParaRPr lang="en-US"/>
           </a:p>
@@ -1022,7 +1021,7 @@
           <a:p>
             <a:fld id="{26516713-2BCE-6145-9123-DB8F3BB907A5}" type="datetimeFigureOut">
               <a:rPr lang="en-US" smtClean="0"/>
-              <a:t>9/7/16</a:t>
+              <a:t>9/15/16</a:t>
             </a:fld>
             <a:endParaRPr lang="en-US"/>
           </a:p>
@@ -1352,7 +1351,7 @@
           <a:p>
             <a:fld id="{26516713-2BCE-6145-9123-DB8F3BB907A5}" type="datetimeFigureOut">
               <a:rPr lang="en-US" smtClean="0"/>
-              <a:t>9/7/16</a:t>
+              <a:t>9/15/16</a:t>
             </a:fld>
             <a:endParaRPr lang="en-US"/>
           </a:p>
@@ -1660,7 +1659,7 @@
           <a:p>
             <a:fld id="{26516713-2BCE-6145-9123-DB8F3BB907A5}" type="datetimeFigureOut">
               <a:rPr lang="en-US" smtClean="0"/>
-              <a:t>9/7/16</a:t>
+              <a:t>9/15/16</a:t>
             </a:fld>
             <a:endParaRPr lang="en-US"/>
           </a:p>
@@ -2081,7 +2080,7 @@
           <a:p>
             <a:fld id="{26516713-2BCE-6145-9123-DB8F3BB907A5}" type="datetimeFigureOut">
               <a:rPr lang="en-US" smtClean="0"/>
-              <a:t>9/7/16</a:t>
+              <a:t>9/15/16</a:t>
             </a:fld>
             <a:endParaRPr lang="en-US"/>
           </a:p>
@@ -2194,7 +2193,7 @@
           <a:p>
             <a:fld id="{26516713-2BCE-6145-9123-DB8F3BB907A5}" type="datetimeFigureOut">
               <a:rPr lang="en-US" smtClean="0"/>
-              <a:t>9/7/16</a:t>
+              <a:t>9/15/16</a:t>
             </a:fld>
             <a:endParaRPr lang="en-US"/>
           </a:p>
@@ -2353,7 +2352,7 @@
           <a:p>
             <a:fld id="{26516713-2BCE-6145-9123-DB8F3BB907A5}" type="datetimeFigureOut">
               <a:rPr lang="en-US" smtClean="0"/>
-              <a:t>9/7/16</a:t>
+              <a:t>9/15/16</a:t>
             </a:fld>
             <a:endParaRPr lang="en-US"/>
           </a:p>
@@ -2737,7 +2736,7 @@
           <a:p>
             <a:fld id="{26516713-2BCE-6145-9123-DB8F3BB907A5}" type="datetimeFigureOut">
               <a:rPr lang="en-US" smtClean="0"/>
-              <a:t>9/7/16</a:t>
+              <a:t>9/15/16</a:t>
             </a:fld>
             <a:endParaRPr lang="en-US"/>
           </a:p>
@@ -3100,7 +3099,7 @@
           <a:p>
             <a:fld id="{26516713-2BCE-6145-9123-DB8F3BB907A5}" type="datetimeFigureOut">
               <a:rPr lang="en-US" smtClean="0"/>
-              <a:t>9/7/16</a:t>
+              <a:t>9/15/16</a:t>
             </a:fld>
             <a:endParaRPr lang="en-US"/>
           </a:p>
@@ -3434,7 +3433,7 @@
           <a:p>
             <a:fld id="{26516713-2BCE-6145-9123-DB8F3BB907A5}" type="datetimeFigureOut">
               <a:rPr lang="en-US" smtClean="0"/>
-              <a:t>9/7/16</a:t>
+              <a:t>9/15/16</a:t>
             </a:fld>
             <a:endParaRPr lang="en-US"/>
           </a:p>
@@ -3943,6 +3942,13 @@
   <p:clrMapOvr>
     <a:masterClrMapping/>
   </p:clrMapOvr>
+  <p:timing>
+    <p:tnLst>
+      <p:par>
+        <p:cTn id="1" dur="indefinite" restart="never" nodeType="tmRoot"/>
+      </p:par>
+    </p:tnLst>
+  </p:timing>
 </p:sld>
 </file>
 
@@ -4523,6 +4529,13 @@
   <p:clrMapOvr>
     <a:masterClrMapping/>
   </p:clrMapOvr>
+  <p:timing>
+    <p:tnLst>
+      <p:par>
+        <p:cTn id="1" dur="indefinite" restart="never" nodeType="tmRoot"/>
+      </p:par>
+    </p:tnLst>
+  </p:timing>
 </p:sld>
 </file>
 
@@ -4553,6 +4566,65 @@
             <p:ph idx="1"/>
           </p:nvPr>
         </p:nvSpPr>
+        <p:spPr>
+          <a:xfrm>
+            <a:off x="380999" y="1719071"/>
+            <a:ext cx="8407893" cy="4878722"/>
+          </a:xfrm>
+        </p:spPr>
+        <p:txBody>
+          <a:bodyPr>
+            <a:normAutofit/>
+          </a:bodyPr>
+          <a:lstStyle/>
+          <a:p>
+            <a:endParaRPr lang="en-US" sz="2800" dirty="0" smtClean="0"/>
+          </a:p>
+          <a:p>
+            <a:endParaRPr lang="en-US" sz="2800" dirty="0"/>
+          </a:p>
+          <a:p>
+            <a:r>
+              <a:rPr lang="en-US" sz="2800" dirty="0" smtClean="0"/>
+              <a:t>Write a code to determine if a number is a power of 2.</a:t>
+            </a:r>
+          </a:p>
+          <a:p>
+            <a:pPr lvl="1"/>
+            <a:endParaRPr lang="en-US" sz="2600" dirty="0"/>
+          </a:p>
+          <a:p>
+            <a:pPr lvl="1"/>
+            <a:r>
+              <a:rPr lang="en-US" sz="2600" dirty="0" smtClean="0"/>
+              <a:t>1, 2, 4, 8, … are powers of 2</a:t>
+            </a:r>
+          </a:p>
+          <a:p>
+            <a:pPr lvl="1"/>
+            <a:r>
+              <a:rPr lang="en-US" sz="2600" dirty="0" smtClean="0"/>
+              <a:t>3 is not.</a:t>
+            </a:r>
+          </a:p>
+          <a:p>
+            <a:endParaRPr lang="en-US" sz="2800" dirty="0" smtClean="0"/>
+          </a:p>
+          <a:p>
+            <a:endParaRPr lang="en-US" sz="2800" dirty="0"/>
+          </a:p>
+        </p:txBody>
+      </p:sp>
+      <p:sp>
+        <p:nvSpPr>
+          <p:cNvPr id="3" name="Title 2"/>
+          <p:cNvSpPr>
+            <a:spLocks noGrp="1"/>
+          </p:cNvSpPr>
+          <p:nvPr>
+            <p:ph type="title"/>
+          </p:nvPr>
+        </p:nvSpPr>
         <p:spPr/>
         <p:txBody>
           <a:bodyPr/>
@@ -4560,56 +4632,7 @@
           <a:p>
             <a:r>
               <a:rPr lang="en-US" dirty="0" smtClean="0"/>
-              <a:t>Yeah, it kind of stinks</a:t>
-            </a:r>
-          </a:p>
-          <a:p>
-            <a:endParaRPr lang="en-US" dirty="0"/>
-          </a:p>
-          <a:p>
-            <a:r>
-              <a:rPr lang="en-US" dirty="0" smtClean="0"/>
-              <a:t>You can run a little script (program) I made to install the badass atom editors on your computer!</a:t>
-            </a:r>
-          </a:p>
-          <a:p>
-            <a:endParaRPr lang="en-US" dirty="0"/>
-          </a:p>
-          <a:p>
-            <a:r>
-              <a:rPr lang="en-US" dirty="0" smtClean="0"/>
-              <a:t>Navigate to the </a:t>
-            </a:r>
-            <a:endParaRPr lang="en-US" dirty="0"/>
-          </a:p>
-        </p:txBody>
-      </p:sp>
-      <p:sp>
-        <p:nvSpPr>
-          <p:cNvPr id="3" name="Title 2"/>
-          <p:cNvSpPr>
-            <a:spLocks noGrp="1"/>
-          </p:cNvSpPr>
-          <p:nvPr>
-            <p:ph type="title"/>
-          </p:nvPr>
-        </p:nvSpPr>
-        <p:spPr/>
-        <p:txBody>
-          <a:bodyPr/>
-          <a:lstStyle/>
-          <a:p>
-            <a:r>
-              <a:rPr lang="en-US" dirty="0" smtClean="0"/>
-              <a:t>How Great is </a:t>
-            </a:r>
-            <a:r>
-              <a:rPr lang="en-US" dirty="0" err="1" smtClean="0"/>
-              <a:t>gedit</a:t>
-            </a:r>
-            <a:r>
-              <a:rPr lang="en-US" dirty="0" smtClean="0"/>
-              <a:t>??</a:t>
+              <a:t>Exercise (1)</a:t>
             </a:r>
             <a:endParaRPr lang="en-US" dirty="0"/>
           </a:p>
@@ -4618,13 +4641,20 @@
     </p:spTree>
     <p:extLst>
       <p:ext uri="{BB962C8B-B14F-4D97-AF65-F5344CB8AC3E}">
-        <p14:creationId xmlns:p14="http://schemas.microsoft.com/office/powerpoint/2010/main" val="1998711399"/>
+        <p14:creationId xmlns:p14="http://schemas.microsoft.com/office/powerpoint/2010/main" val="2838456003"/>
       </p:ext>
     </p:extLst>
   </p:cSld>
   <p:clrMapOvr>
     <a:masterClrMapping/>
   </p:clrMapOvr>
+  <p:timing>
+    <p:tnLst>
+      <p:par>
+        <p:cTn id="1" dur="indefinite" restart="never" nodeType="tmRoot"/>
+      </p:par>
+    </p:tnLst>
+  </p:timing>
 </p:sld>
 </file>
 
@@ -4675,25 +4705,32 @@
           <a:p>
             <a:r>
               <a:rPr lang="en-US" sz="2800" dirty="0" smtClean="0"/>
-              <a:t>Write a code to determine if a number is a power of 2.</a:t>
-            </a:r>
+              <a:t>Write a code to determine if a number is a palindrome.</a:t>
+            </a:r>
+          </a:p>
+          <a:p>
+            <a:endParaRPr lang="en-US" sz="2800" dirty="0"/>
           </a:p>
           <a:p>
             <a:pPr lvl="1"/>
-            <a:endParaRPr lang="en-US" sz="2600" dirty="0"/>
+            <a:r>
+              <a:rPr lang="en-US" sz="2400" dirty="0" smtClean="0"/>
+              <a:t>A palindrome number is equal to its reverse.</a:t>
+            </a:r>
+            <a:endParaRPr lang="en-US" sz="2400" dirty="0"/>
           </a:p>
           <a:p>
             <a:pPr lvl="1"/>
             <a:r>
               <a:rPr lang="en-US" sz="2600" dirty="0" smtClean="0"/>
-              <a:t>1, 2, 4, 8, … are powers of 2</a:t>
+              <a:t>121, 14541 are palindrome</a:t>
             </a:r>
           </a:p>
           <a:p>
             <a:pPr lvl="1"/>
             <a:r>
               <a:rPr lang="en-US" sz="2600" dirty="0" smtClean="0"/>
-              <a:t>3 is not.</a:t>
+              <a:t>134 is not</a:t>
             </a:r>
           </a:p>
           <a:p>
@@ -4721,7 +4758,7 @@
           <a:p>
             <a:r>
               <a:rPr lang="en-US" dirty="0" smtClean="0"/>
-              <a:t>Exercise (1)</a:t>
+              <a:t>Exercise (2)</a:t>
             </a:r>
             <a:endParaRPr lang="en-US" dirty="0"/>
           </a:p>
@@ -4730,13 +4767,20 @@
     </p:spTree>
     <p:extLst>
       <p:ext uri="{BB962C8B-B14F-4D97-AF65-F5344CB8AC3E}">
-        <p14:creationId xmlns:p14="http://schemas.microsoft.com/office/powerpoint/2010/main" val="2838456003"/>
+        <p14:creationId xmlns:p14="http://schemas.microsoft.com/office/powerpoint/2010/main" val="401986704"/>
       </p:ext>
     </p:extLst>
   </p:cSld>
   <p:clrMapOvr>
     <a:masterClrMapping/>
   </p:clrMapOvr>
+  <p:timing>
+    <p:tnLst>
+      <p:par>
+        <p:cTn id="1" dur="indefinite" restart="never" nodeType="tmRoot"/>
+      </p:par>
+    </p:tnLst>
+  </p:timing>
 </p:sld>
 </file>
 
@@ -4787,39 +4831,49 @@
           <a:p>
             <a:r>
               <a:rPr lang="en-US" sz="2800" dirty="0" smtClean="0"/>
-              <a:t>Write a code to determine if a number is a palindrome.</a:t>
-            </a:r>
-          </a:p>
-          <a:p>
-            <a:endParaRPr lang="en-US" sz="2800" dirty="0"/>
+              <a:t>Write a code to print the Fibonacci series up to a given number</a:t>
+            </a:r>
           </a:p>
           <a:p>
             <a:pPr lvl="1"/>
             <a:r>
-              <a:rPr lang="en-US" sz="2400" dirty="0" smtClean="0"/>
-              <a:t>A palindrome number is equal to its reverse.</a:t>
-            </a:r>
-            <a:endParaRPr lang="en-US" sz="2400" dirty="0"/>
+              <a:rPr lang="en-US" sz="2800" dirty="0"/>
+              <a:t>Fibonacci Sequence: 1, 1, 2, 3, 5, 8, 13, 21, 34, </a:t>
+            </a:r>
+            <a:r>
+              <a:rPr lang="en-US" sz="2800" dirty="0" smtClean="0"/>
+              <a:t>…</a:t>
+            </a:r>
           </a:p>
           <a:p>
             <a:pPr lvl="1"/>
-            <a:r>
-              <a:rPr lang="en-US" sz="2600" dirty="0" smtClean="0"/>
-              <a:t>121, 14541 are palindrome</a:t>
-            </a:r>
+            <a:endParaRPr lang="en-US" sz="2600" dirty="0" smtClean="0"/>
           </a:p>
           <a:p>
             <a:pPr lvl="1"/>
             <a:r>
-              <a:rPr lang="en-US" sz="2600" dirty="0" smtClean="0"/>
-              <a:t>134 is not</a:t>
-            </a:r>
-          </a:p>
-          <a:p>
-            <a:endParaRPr lang="en-US" sz="2800" dirty="0" smtClean="0"/>
-          </a:p>
-          <a:p>
-            <a:endParaRPr lang="en-US" sz="2800" dirty="0"/>
+              <a:rPr lang="en-US" sz="2800" dirty="0"/>
+              <a:t>N = 6. </a:t>
+            </a:r>
+            <a:r>
+              <a:rPr lang="en-US" sz="2800" dirty="0">
+                <a:sym typeface="Wingdings"/>
+              </a:rPr>
+              <a:t> Output</a:t>
+            </a:r>
+            <a:r>
+              <a:rPr lang="en-US" sz="2800">
+                <a:sym typeface="Wingdings"/>
+              </a:rPr>
+              <a:t>: </a:t>
+            </a:r>
+            <a:r>
+              <a:rPr lang="en-US" sz="2800" smtClean="0">
+                <a:sym typeface="Wingdings"/>
+              </a:rPr>
+              <a:t>0,1,1,2,3,5</a:t>
+            </a:r>
+            <a:endParaRPr lang="en-US" sz="2600" dirty="0"/>
           </a:p>
         </p:txBody>
       </p:sp>
@@ -4840,7 +4894,7 @@
           <a:p>
             <a:r>
               <a:rPr lang="en-US" dirty="0" smtClean="0"/>
-              <a:t>Exercise (2)</a:t>
+              <a:t>Exercise (3)</a:t>
             </a:r>
             <a:endParaRPr lang="en-US" dirty="0"/>
           </a:p>
@@ -4849,13 +4903,20 @@
     </p:spTree>
     <p:extLst>
       <p:ext uri="{BB962C8B-B14F-4D97-AF65-F5344CB8AC3E}">
-        <p14:creationId xmlns:p14="http://schemas.microsoft.com/office/powerpoint/2010/main" val="401986704"/>
+        <p14:creationId xmlns:p14="http://schemas.microsoft.com/office/powerpoint/2010/main" val="1731111996"/>
       </p:ext>
     </p:extLst>
   </p:cSld>
   <p:clrMapOvr>
     <a:masterClrMapping/>
   </p:clrMapOvr>
+  <p:timing>
+    <p:tnLst>
+      <p:par>
+        <p:cTn id="1" dur="indefinite" restart="never" nodeType="tmRoot"/>
+      </p:par>
+    </p:tnLst>
+  </p:timing>
 </p:sld>
 </file>
 
@@ -4906,7 +4967,7 @@
           <a:p>
             <a:r>
               <a:rPr lang="en-US" sz="2800" dirty="0" smtClean="0"/>
-              <a:t>Write a code to print the Fibonacci series up to a given number</a:t>
+              <a:t>Write a code to compute the Greatest Common Divisor (GCD) of a pair of numbers. </a:t>
             </a:r>
           </a:p>
           <a:p>
@@ -4916,7 +4977,7 @@
             <a:pPr lvl="1"/>
             <a:r>
               <a:rPr lang="en-US" sz="2400" dirty="0" smtClean="0"/>
-              <a:t>Fibonacci Sequence: 1, 1, 2, 3, 5, 8, 13, 21, 34, …</a:t>
+              <a:t>Input: 8, 12</a:t>
             </a:r>
           </a:p>
           <a:p>
@@ -4926,14 +4987,16 @@
           <a:p>
             <a:pPr lvl="1"/>
             <a:r>
-              <a:rPr lang="en-US" sz="2400" dirty="0" smtClean="0"/>
-              <a:t>N = 4. </a:t>
-            </a:r>
-            <a:r>
               <a:rPr lang="en-US" sz="2400" dirty="0" smtClean="0">
                 <a:sym typeface="Wingdings"/>
               </a:rPr>
-              <a:t> Output: 1,1,2,3.</a:t>
+              <a:t>Output: </a:t>
+            </a:r>
+            <a:r>
+              <a:rPr lang="en-US" sz="2400" dirty="0">
+                <a:sym typeface="Wingdings"/>
+              </a:rPr>
+              <a:t>4</a:t>
             </a:r>
             <a:endParaRPr lang="en-US" sz="2800" dirty="0" smtClean="0"/>
           </a:p>
@@ -4959,7 +5022,7 @@
           <a:p>
             <a:r>
               <a:rPr lang="en-US" dirty="0" smtClean="0"/>
-              <a:t>Exercise (3)</a:t>
+              <a:t>Exercise (4)</a:t>
             </a:r>
             <a:endParaRPr lang="en-US" dirty="0"/>
           </a:p>
@@ -4968,13 +5031,20 @@
     </p:spTree>
     <p:extLst>
       <p:ext uri="{BB962C8B-B14F-4D97-AF65-F5344CB8AC3E}">
-        <p14:creationId xmlns:p14="http://schemas.microsoft.com/office/powerpoint/2010/main" val="1731111996"/>
+        <p14:creationId xmlns:p14="http://schemas.microsoft.com/office/powerpoint/2010/main" val="4131366800"/>
       </p:ext>
     </p:extLst>
   </p:cSld>
   <p:clrMapOvr>
     <a:masterClrMapping/>
   </p:clrMapOvr>
+  <p:timing>
+    <p:tnLst>
+      <p:par>
+        <p:cTn id="1" dur="indefinite" restart="never" nodeType="tmRoot"/>
+      </p:par>
+    </p:tnLst>
+  </p:timing>
 </p:sld>
 </file>
 
@@ -5017,127 +5087,6 @@
           </a:bodyPr>
           <a:lstStyle/>
           <a:p>
-            <a:endParaRPr lang="en-US" sz="2800" dirty="0" smtClean="0"/>
-          </a:p>
-          <a:p>
-            <a:endParaRPr lang="en-US" sz="2800" dirty="0"/>
-          </a:p>
-          <a:p>
-            <a:r>
-              <a:rPr lang="en-US" sz="2800" dirty="0" smtClean="0"/>
-              <a:t>Write a code to compute the Greatest Common Divisor (GCD) of a pair of numbers. </a:t>
-            </a:r>
-          </a:p>
-          <a:p>
-            <a:endParaRPr lang="en-US" sz="2800" dirty="0"/>
-          </a:p>
-          <a:p>
-            <a:pPr lvl="1"/>
-            <a:r>
-              <a:rPr lang="en-US" sz="2400" dirty="0" smtClean="0"/>
-              <a:t>Input: 8, 12</a:t>
-            </a:r>
-          </a:p>
-          <a:p>
-            <a:pPr lvl="1"/>
-            <a:endParaRPr lang="en-US" sz="2400" dirty="0"/>
-          </a:p>
-          <a:p>
-            <a:pPr lvl="1"/>
-            <a:r>
-              <a:rPr lang="en-US" sz="2400" dirty="0" smtClean="0">
-                <a:sym typeface="Wingdings"/>
-              </a:rPr>
-              <a:t>Output: </a:t>
-            </a:r>
-            <a:r>
-              <a:rPr lang="en-US" sz="2400" dirty="0">
-                <a:sym typeface="Wingdings"/>
-              </a:rPr>
-              <a:t>4</a:t>
-            </a:r>
-            <a:endParaRPr lang="en-US" sz="2800" dirty="0" smtClean="0"/>
-          </a:p>
-          <a:p>
-            <a:endParaRPr lang="en-US" sz="2800" dirty="0"/>
-          </a:p>
-        </p:txBody>
-      </p:sp>
-      <p:sp>
-        <p:nvSpPr>
-          <p:cNvPr id="3" name="Title 2"/>
-          <p:cNvSpPr>
-            <a:spLocks noGrp="1"/>
-          </p:cNvSpPr>
-          <p:nvPr>
-            <p:ph type="title"/>
-          </p:nvPr>
-        </p:nvSpPr>
-        <p:spPr/>
-        <p:txBody>
-          <a:bodyPr/>
-          <a:lstStyle/>
-          <a:p>
-            <a:r>
-              <a:rPr lang="en-US" dirty="0" smtClean="0"/>
-              <a:t>Exercise (4)</a:t>
-            </a:r>
-            <a:endParaRPr lang="en-US" dirty="0"/>
-          </a:p>
-        </p:txBody>
-      </p:sp>
-    </p:spTree>
-    <p:extLst>
-      <p:ext uri="{BB962C8B-B14F-4D97-AF65-F5344CB8AC3E}">
-        <p14:creationId xmlns:p14="http://schemas.microsoft.com/office/powerpoint/2010/main" val="4131366800"/>
-      </p:ext>
-    </p:extLst>
-  </p:cSld>
-  <p:clrMapOvr>
-    <a:masterClrMapping/>
-  </p:clrMapOvr>
-</p:sld>
-</file>
-
-<file path=ppt/slides/slide16.xml><?xml version="1.0" encoding="utf-8"?>
-<p:sld xmlns:a="http://schemas.openxmlformats.org/drawingml/2006/main" xmlns:r="http://schemas.openxmlformats.org/officeDocument/2006/relationships" xmlns:p="http://schemas.openxmlformats.org/presentationml/2006/main">
-  <p:cSld>
-    <p:spTree>
-      <p:nvGrpSpPr>
-        <p:cNvPr id="1" name=""/>
-        <p:cNvGrpSpPr/>
-        <p:nvPr/>
-      </p:nvGrpSpPr>
-      <p:grpSpPr>
-        <a:xfrm>
-          <a:off x="0" y="0"/>
-          <a:ext cx="0" cy="0"/>
-          <a:chOff x="0" y="0"/>
-          <a:chExt cx="0" cy="0"/>
-        </a:xfrm>
-      </p:grpSpPr>
-      <p:sp>
-        <p:nvSpPr>
-          <p:cNvPr id="2" name="Content Placeholder 1"/>
-          <p:cNvSpPr>
-            <a:spLocks noGrp="1"/>
-          </p:cNvSpPr>
-          <p:nvPr>
-            <p:ph idx="1"/>
-          </p:nvPr>
-        </p:nvSpPr>
-        <p:spPr>
-          <a:xfrm>
-            <a:off x="380999" y="1719071"/>
-            <a:ext cx="8407893" cy="4878722"/>
-          </a:xfrm>
-        </p:spPr>
-        <p:txBody>
-          <a:bodyPr>
-            <a:normAutofit/>
-          </a:bodyPr>
-          <a:lstStyle/>
-          <a:p>
             <a:pPr marL="45720" indent="0">
               <a:buNone/>
             </a:pPr>
@@ -5196,6 +5145,13 @@
   <p:clrMapOvr>
     <a:masterClrMapping/>
   </p:clrMapOvr>
+  <p:timing>
+    <p:tnLst>
+      <p:par>
+        <p:cTn id="1" dur="indefinite" restart="never" nodeType="tmRoot"/>
+      </p:par>
+    </p:tnLst>
+  </p:timing>
 </p:sld>
 </file>
 
@@ -5411,6 +5367,13 @@
   <p:clrMapOvr>
     <a:masterClrMapping/>
   </p:clrMapOvr>
+  <p:timing>
+    <p:tnLst>
+      <p:par>
+        <p:cTn id="1" dur="indefinite" restart="never" nodeType="tmRoot"/>
+      </p:par>
+    </p:tnLst>
+  </p:timing>
 </p:sld>
 </file>
 
@@ -5462,11 +5425,7 @@
           <a:p>
             <a:r>
               <a:rPr lang="en-US" sz="2800" dirty="0" smtClean="0"/>
-              <a:t>Then, open a </a:t>
-            </a:r>
-            <a:r>
-              <a:rPr lang="en-US" sz="2800" dirty="0" smtClean="0"/>
-              <a:t>Terminal!</a:t>
+              <a:t>Then, open a Terminal!</a:t>
             </a:r>
           </a:p>
           <a:p>
@@ -5554,6 +5513,13 @@
   <p:clrMapOvr>
     <a:masterClrMapping/>
   </p:clrMapOvr>
+  <p:timing>
+    <p:tnLst>
+      <p:par>
+        <p:cTn id="1" dur="indefinite" restart="never" nodeType="tmRoot"/>
+      </p:par>
+    </p:tnLst>
+  </p:timing>
 </p:sld>
 </file>
 
@@ -5844,6 +5810,13 @@
   <p:clrMapOvr>
     <a:masterClrMapping/>
   </p:clrMapOvr>
+  <p:timing>
+    <p:tnLst>
+      <p:par>
+        <p:cTn id="1" dur="indefinite" restart="never" nodeType="tmRoot"/>
+      </p:par>
+    </p:tnLst>
+  </p:timing>
 </p:sld>
 </file>
 
@@ -5980,6 +5953,13 @@
   <p:clrMapOvr>
     <a:masterClrMapping/>
   </p:clrMapOvr>
+  <p:timing>
+    <p:tnLst>
+      <p:par>
+        <p:cTn id="1" dur="indefinite" restart="never" nodeType="tmRoot"/>
+      </p:par>
+    </p:tnLst>
+  </p:timing>
 </p:sld>
 </file>
 
@@ -6252,6 +6232,13 @@
   <p:clrMapOvr>
     <a:masterClrMapping/>
   </p:clrMapOvr>
+  <p:timing>
+    <p:tnLst>
+      <p:par>
+        <p:cTn id="1" dur="indefinite" restart="never" nodeType="tmRoot"/>
+      </p:par>
+    </p:tnLst>
+  </p:timing>
 </p:sld>
 </file>
 
@@ -6334,7 +6321,19 @@
             </a:r>
             <a:r>
               <a:rPr lang="en-US" sz="2400" dirty="0"/>
-              <a:t>++ -o helloworld.out helloworld.cpp</a:t>
+              <a:t>++ </a:t>
+            </a:r>
+            <a:r>
+              <a:rPr lang="en-US" sz="2400" dirty="0" err="1" smtClean="0"/>
+              <a:t>helloworld.cpp</a:t>
+            </a:r>
+            <a:r>
+              <a:rPr lang="en-US" sz="2400" dirty="0"/>
+              <a:t> -o </a:t>
+            </a:r>
+            <a:r>
+              <a:rPr lang="en-US" sz="2400" dirty="0" err="1"/>
+              <a:t>helloworld.out</a:t>
             </a:r>
             <a:endParaRPr lang="en-US" sz="2400" dirty="0" smtClean="0"/>
           </a:p>
@@ -6462,6 +6461,13 @@
   <p:clrMapOvr>
     <a:masterClrMapping/>
   </p:clrMapOvr>
+  <p:timing>
+    <p:tnLst>
+      <p:par>
+        <p:cTn id="1" dur="indefinite" restart="never" nodeType="tmRoot"/>
+      </p:par>
+    </p:tnLst>
+  </p:timing>
 </p:sld>
 </file>
 
@@ -7058,6 +7064,13 @@
   <p:clrMapOvr>
     <a:masterClrMapping/>
   </p:clrMapOvr>
+  <p:timing>
+    <p:tnLst>
+      <p:par>
+        <p:cTn id="1" dur="indefinite" restart="never" nodeType="tmRoot"/>
+      </p:par>
+    </p:tnLst>
+  </p:timing>
 </p:sld>
 </file>
 
@@ -7249,6 +7262,13 @@
   <p:clrMapOvr>
     <a:masterClrMapping/>
   </p:clrMapOvr>
+  <p:timing>
+    <p:tnLst>
+      <p:par>
+        <p:cTn id="1" dur="indefinite" restart="never" nodeType="tmRoot"/>
+      </p:par>
+    </p:tnLst>
+  </p:timing>
 </p:sld>
 </file>
 

</xml_diff>